<commit_message>
adding new test file for pptx to be able to validate content extraction
</commit_message>
<xml_diff>
--- a/content/test/source/test.pptx
+++ b/content/test/source/test.pptx
@@ -32411,23 +32411,7 @@
             </a:pPr>
             <a:r>
               <a:rPr lang="en"/>
-              <a:t>Headline</a:t>
-            </a:r>
-            <a:endParaRPr/>
-          </a:p>
-          <a:p>
-            <a:pPr indent="0" lvl="0" marL="0" rtl="0" algn="l">
-              <a:spcBef>
-                <a:spcPts val="0"/>
-              </a:spcBef>
-              <a:spcAft>
-                <a:spcPts val="0"/>
-              </a:spcAft>
-              <a:buNone/>
-            </a:pPr>
-            <a:r>
-              <a:rPr lang="en"/>
-              <a:t>Title Here</a:t>
+              <a:t>Solid Base Consult</a:t>
             </a:r>
             <a:endParaRPr/>
           </a:p>
@@ -32471,7 +32455,7 @@
         <p:spPr>
           <a:xfrm>
             <a:off x="420875" y="3318675"/>
-            <a:ext cx="3698700" cy="521100"/>
+            <a:ext cx="3698700" cy="846300"/>
           </a:xfrm>
           <a:prstGeom prst="rect">
             <a:avLst/>
@@ -32494,7 +32478,7 @@
             </a:pPr>
             <a:r>
               <a:rPr lang="en"/>
-              <a:t>Subtitle</a:t>
+              <a:t>Financial results</a:t>
             </a:r>
             <a:endParaRPr/>
           </a:p>
@@ -32510,7 +32494,7 @@
             </a:pPr>
             <a:r>
               <a:rPr lang="en"/>
-              <a:t>Date</a:t>
+              <a:t>Date 7 Jan 2025</a:t>
             </a:r>
             <a:endParaRPr/>
           </a:p>
@@ -32601,7 +32585,7 @@
             </a:pPr>
             <a:r>
               <a:rPr lang="en"/>
-              <a:t>In 20XX</a:t>
+              <a:t>In 2024</a:t>
             </a:r>
             <a:endParaRPr/>
           </a:p>
@@ -32641,7 +32625,15 @@
             </a:pPr>
             <a:r>
               <a:rPr lang="en"/>
-              <a:t>Lorem ipsum dolor sit amet, consectetur adipiscing elit, sed do eiusmod tempor incididunt ut labore et dolore magna aliqua.</a:t>
+              <a:t>The team is in good shape and very motivated and we have no regretted </a:t>
+            </a:r>
+            <a:r>
+              <a:rPr lang="en"/>
+              <a:t>attrition</a:t>
+            </a:r>
+            <a:r>
+              <a:rPr lang="en"/>
+              <a:t> at all.</a:t>
             </a:r>
             <a:endParaRPr/>
           </a:p>
@@ -32686,7 +32678,7 @@
             </a:pPr>
             <a:r>
               <a:rPr lang="en"/>
-              <a:t>Lorem ipsum dolor sit amet, consectetur adipiscing elit.</a:t>
+              <a:t>This was a very good year with profit and no indirect costs</a:t>
             </a:r>
             <a:endParaRPr/>
           </a:p>
@@ -32749,7 +32741,7 @@
                 <a:cs typeface="Inter"/>
                 <a:sym typeface="Inter"/>
               </a:rPr>
-              <a:t>TEXT</a:t>
+              <a:t>Profit</a:t>
             </a:r>
             <a:br>
               <a:rPr lang="en" sz="1600">
@@ -32772,7 +32764,19 @@
                 <a:cs typeface="Inter SemiBold"/>
                 <a:sym typeface="Inter SemiBold"/>
               </a:rPr>
-              <a:t>00%</a:t>
+              <a:t>50</a:t>
+            </a:r>
+            <a:r>
+              <a:rPr lang="en" sz="3100">
+                <a:solidFill>
+                  <a:schemeClr val="dk2"/>
+                </a:solidFill>
+                <a:latin typeface="Inter SemiBold"/>
+                <a:ea typeface="Inter SemiBold"/>
+                <a:cs typeface="Inter SemiBold"/>
+                <a:sym typeface="Inter SemiBold"/>
+              </a:rPr>
+              <a:t>%</a:t>
             </a:r>
             <a:endParaRPr sz="3100">
               <a:solidFill>
@@ -32794,7 +32798,7 @@
         </p:nvSpPr>
         <p:spPr>
           <a:xfrm>
-            <a:off x="603486" y="2076678"/>
+            <a:off x="603475" y="2076675"/>
             <a:ext cx="1087200" cy="1087200"/>
           </a:xfrm>
           <a:prstGeom prst="flowChartConnector">
@@ -32841,7 +32845,7 @@
                 <a:cs typeface="Inter"/>
                 <a:sym typeface="Inter"/>
               </a:rPr>
-              <a:t>TEXT</a:t>
+              <a:t>Opex</a:t>
             </a:r>
             <a:endParaRPr sz="1600">
               <a:solidFill>
@@ -32873,7 +32877,19 @@
                 <a:cs typeface="Inter"/>
                 <a:sym typeface="Inter"/>
               </a:rPr>
-              <a:t>00%</a:t>
+              <a:t>3</a:t>
+            </a:r>
+            <a:r>
+              <a:rPr lang="en" sz="2200">
+                <a:solidFill>
+                  <a:schemeClr val="lt1"/>
+                </a:solidFill>
+                <a:latin typeface="Inter"/>
+                <a:ea typeface="Inter"/>
+                <a:cs typeface="Inter"/>
+                <a:sym typeface="Inter"/>
+              </a:rPr>
+              <a:t>0%</a:t>
             </a:r>
             <a:endParaRPr sz="2200">
               <a:solidFill>
@@ -32895,8 +32911,8 @@
         </p:nvSpPr>
         <p:spPr>
           <a:xfrm>
-            <a:off x="2097233" y="2076678"/>
-            <a:ext cx="1087200" cy="1087200"/>
+            <a:off x="2097224" y="2076675"/>
+            <a:ext cx="1170600" cy="1087200"/>
           </a:xfrm>
           <a:prstGeom prst="flowChartConnector">
             <a:avLst/>
@@ -32942,7 +32958,7 @@
                 <a:cs typeface="Inter"/>
                 <a:sym typeface="Inter"/>
               </a:rPr>
-              <a:t>TEXT</a:t>
+              <a:t>Capex</a:t>
             </a:r>
             <a:endParaRPr sz="1600">
               <a:solidFill>
@@ -32974,7 +32990,7 @@
                 <a:cs typeface="Inter"/>
                 <a:sym typeface="Inter"/>
               </a:rPr>
-              <a:t>00%</a:t>
+              <a:t>20%</a:t>
             </a:r>
             <a:endParaRPr sz="2200">
               <a:solidFill>
@@ -32996,8 +33012,8 @@
         </p:nvSpPr>
         <p:spPr>
           <a:xfrm>
-            <a:off x="3590980" y="2076678"/>
-            <a:ext cx="1087200" cy="1087200"/>
+            <a:off x="3478462" y="2076675"/>
+            <a:ext cx="1311000" cy="1087200"/>
           </a:xfrm>
           <a:prstGeom prst="flowChartConnector">
             <a:avLst/>
@@ -33043,7 +33059,7 @@
                 <a:cs typeface="Inter"/>
                 <a:sym typeface="Inter"/>
               </a:rPr>
-              <a:t>TEXT</a:t>
+              <a:t>Income</a:t>
             </a:r>
             <a:endParaRPr sz="1600">
               <a:solidFill>
@@ -33075,7 +33091,19 @@
                 <a:cs typeface="Inter"/>
                 <a:sym typeface="Inter"/>
               </a:rPr>
-              <a:t>00%</a:t>
+              <a:t>10</a:t>
+            </a:r>
+            <a:r>
+              <a:rPr lang="en" sz="2200">
+                <a:solidFill>
+                  <a:schemeClr val="lt1"/>
+                </a:solidFill>
+                <a:latin typeface="Inter"/>
+                <a:ea typeface="Inter"/>
+                <a:cs typeface="Inter"/>
+                <a:sym typeface="Inter"/>
+              </a:rPr>
+              <a:t>0%</a:t>
             </a:r>
             <a:endParaRPr sz="2200">
               <a:solidFill>
@@ -33092,351 +33120,6 @@
       <p:sp>
         <p:nvSpPr>
           <p:cNvPr id="354" name="Google Shape;354;p42"/>
-          <p:cNvSpPr/>
-          <p:nvPr/>
-        </p:nvSpPr>
-        <p:spPr>
-          <a:xfrm>
-            <a:off x="5084727" y="2076678"/>
-            <a:ext cx="1087200" cy="1087200"/>
-          </a:xfrm>
-          <a:prstGeom prst="flowChartConnector">
-            <a:avLst/>
-          </a:prstGeom>
-          <a:noFill/>
-          <a:ln cap="flat" cmpd="sng" w="19050">
-            <a:solidFill>
-              <a:schemeClr val="lt2"/>
-            </a:solidFill>
-            <a:prstDash val="solid"/>
-            <a:round/>
-            <a:headEnd len="sm" w="sm" type="none"/>
-            <a:tailEnd len="sm" w="sm" type="none"/>
-          </a:ln>
-        </p:spPr>
-        <p:txBody>
-          <a:bodyPr anchorCtr="0" anchor="ctr" bIns="91425" lIns="91425" spcFirstLastPara="1" rIns="91425" wrap="square" tIns="91425">
-            <a:noAutofit/>
-          </a:bodyPr>
-          <a:lstStyle/>
-          <a:p>
-            <a:pPr indent="0" lvl="0" marL="0" rtl="0" algn="ctr">
-              <a:spcBef>
-                <a:spcPts val="0"/>
-              </a:spcBef>
-              <a:spcAft>
-                <a:spcPts val="0"/>
-              </a:spcAft>
-              <a:buClr>
-                <a:schemeClr val="dk1"/>
-              </a:buClr>
-              <a:buSzPts val="1100"/>
-              <a:buFont typeface="Arial"/>
-              <a:buNone/>
-            </a:pPr>
-            <a:r>
-              <a:rPr lang="en" sz="1600">
-                <a:solidFill>
-                  <a:schemeClr val="lt1"/>
-                </a:solidFill>
-                <a:latin typeface="Inter"/>
-                <a:ea typeface="Inter"/>
-                <a:cs typeface="Inter"/>
-                <a:sym typeface="Inter"/>
-              </a:rPr>
-              <a:t>TEXT</a:t>
-            </a:r>
-            <a:endParaRPr sz="1600">
-              <a:solidFill>
-                <a:schemeClr val="lt1"/>
-              </a:solidFill>
-              <a:latin typeface="Inter"/>
-              <a:ea typeface="Inter"/>
-              <a:cs typeface="Inter"/>
-              <a:sym typeface="Inter"/>
-            </a:endParaRPr>
-          </a:p>
-          <a:p>
-            <a:pPr indent="0" lvl="0" marL="0" rtl="0" algn="ctr">
-              <a:spcBef>
-                <a:spcPts val="0"/>
-              </a:spcBef>
-              <a:spcAft>
-                <a:spcPts val="0"/>
-              </a:spcAft>
-              <a:buNone/>
-            </a:pPr>
-            <a:r>
-              <a:rPr lang="en" sz="2200">
-                <a:solidFill>
-                  <a:schemeClr val="lt1"/>
-                </a:solidFill>
-                <a:latin typeface="Inter"/>
-                <a:ea typeface="Inter"/>
-                <a:cs typeface="Inter"/>
-                <a:sym typeface="Inter"/>
-              </a:rPr>
-              <a:t>00%</a:t>
-            </a:r>
-            <a:endParaRPr sz="2200">
-              <a:solidFill>
-                <a:schemeClr val="lt1"/>
-              </a:solidFill>
-              <a:latin typeface="Inter"/>
-              <a:ea typeface="Inter"/>
-              <a:cs typeface="Inter"/>
-              <a:sym typeface="Inter"/>
-            </a:endParaRPr>
-          </a:p>
-        </p:txBody>
-      </p:sp>
-      <p:sp>
-        <p:nvSpPr>
-          <p:cNvPr id="355" name="Google Shape;355;p42"/>
-          <p:cNvSpPr txBox="1"/>
-          <p:nvPr/>
-        </p:nvSpPr>
-        <p:spPr>
-          <a:xfrm>
-            <a:off x="705036" y="3265713"/>
-            <a:ext cx="884100" cy="330900"/>
-          </a:xfrm>
-          <a:prstGeom prst="rect">
-            <a:avLst/>
-          </a:prstGeom>
-          <a:noFill/>
-          <a:ln>
-            <a:noFill/>
-          </a:ln>
-        </p:spPr>
-        <p:txBody>
-          <a:bodyPr anchorCtr="0" anchor="t" bIns="91425" lIns="91425" spcFirstLastPara="1" rIns="91425" wrap="square" tIns="91425">
-            <a:spAutoFit/>
-          </a:bodyPr>
-          <a:lstStyle/>
-          <a:p>
-            <a:pPr indent="0" lvl="0" marL="0" rtl="0" algn="ctr">
-              <a:lnSpc>
-                <a:spcPct val="115000"/>
-              </a:lnSpc>
-              <a:spcBef>
-                <a:spcPts val="0"/>
-              </a:spcBef>
-              <a:spcAft>
-                <a:spcPts val="0"/>
-              </a:spcAft>
-              <a:buNone/>
-            </a:pPr>
-            <a:r>
-              <a:rPr lang="en" sz="950">
-                <a:solidFill>
-                  <a:schemeClr val="lt2"/>
-                </a:solidFill>
-                <a:latin typeface="Inter SemiBold"/>
-                <a:ea typeface="Inter SemiBold"/>
-                <a:cs typeface="Inter SemiBold"/>
-                <a:sym typeface="Inter SemiBold"/>
-              </a:rPr>
-              <a:t>TEXT HERE</a:t>
-            </a:r>
-            <a:endParaRPr sz="950">
-              <a:solidFill>
-                <a:schemeClr val="lt2"/>
-              </a:solidFill>
-              <a:latin typeface="Inter SemiBold"/>
-              <a:ea typeface="Inter SemiBold"/>
-              <a:cs typeface="Inter SemiBold"/>
-              <a:sym typeface="Inter SemiBold"/>
-            </a:endParaRPr>
-          </a:p>
-        </p:txBody>
-      </p:sp>
-      <p:sp>
-        <p:nvSpPr>
-          <p:cNvPr id="356" name="Google Shape;356;p42"/>
-          <p:cNvSpPr txBox="1"/>
-          <p:nvPr/>
-        </p:nvSpPr>
-        <p:spPr>
-          <a:xfrm>
-            <a:off x="2097300" y="3262950"/>
-            <a:ext cx="1087200" cy="330900"/>
-          </a:xfrm>
-          <a:prstGeom prst="rect">
-            <a:avLst/>
-          </a:prstGeom>
-          <a:noFill/>
-          <a:ln>
-            <a:noFill/>
-          </a:ln>
-        </p:spPr>
-        <p:txBody>
-          <a:bodyPr anchorCtr="0" anchor="t" bIns="91425" lIns="91425" spcFirstLastPara="1" rIns="91425" wrap="square" tIns="91425">
-            <a:spAutoFit/>
-          </a:bodyPr>
-          <a:lstStyle/>
-          <a:p>
-            <a:pPr indent="0" lvl="0" marL="0" rtl="0" algn="ctr">
-              <a:lnSpc>
-                <a:spcPct val="115000"/>
-              </a:lnSpc>
-              <a:spcBef>
-                <a:spcPts val="0"/>
-              </a:spcBef>
-              <a:spcAft>
-                <a:spcPts val="0"/>
-              </a:spcAft>
-              <a:buNone/>
-            </a:pPr>
-            <a:r>
-              <a:rPr lang="en" sz="950">
-                <a:solidFill>
-                  <a:schemeClr val="lt2"/>
-                </a:solidFill>
-                <a:latin typeface="Inter SemiBold"/>
-                <a:ea typeface="Inter SemiBold"/>
-                <a:cs typeface="Inter SemiBold"/>
-                <a:sym typeface="Inter SemiBold"/>
-              </a:rPr>
-              <a:t>TEXT HERE</a:t>
-            </a:r>
-            <a:endParaRPr sz="950">
-              <a:solidFill>
-                <a:schemeClr val="lt2"/>
-              </a:solidFill>
-              <a:latin typeface="Inter SemiBold"/>
-              <a:ea typeface="Inter SemiBold"/>
-              <a:cs typeface="Inter SemiBold"/>
-              <a:sym typeface="Inter SemiBold"/>
-            </a:endParaRPr>
-          </a:p>
-        </p:txBody>
-      </p:sp>
-      <p:sp>
-        <p:nvSpPr>
-          <p:cNvPr id="357" name="Google Shape;357;p42"/>
-          <p:cNvSpPr txBox="1"/>
-          <p:nvPr/>
-        </p:nvSpPr>
-        <p:spPr>
-          <a:xfrm>
-            <a:off x="3590975" y="3262950"/>
-            <a:ext cx="1087200" cy="330900"/>
-          </a:xfrm>
-          <a:prstGeom prst="rect">
-            <a:avLst/>
-          </a:prstGeom>
-          <a:noFill/>
-          <a:ln>
-            <a:noFill/>
-          </a:ln>
-        </p:spPr>
-        <p:txBody>
-          <a:bodyPr anchorCtr="0" anchor="t" bIns="91425" lIns="91425" spcFirstLastPara="1" rIns="91425" wrap="square" tIns="91425">
-            <a:spAutoFit/>
-          </a:bodyPr>
-          <a:lstStyle/>
-          <a:p>
-            <a:pPr indent="0" lvl="0" marL="0" rtl="0" algn="ctr">
-              <a:lnSpc>
-                <a:spcPct val="115000"/>
-              </a:lnSpc>
-              <a:spcBef>
-                <a:spcPts val="0"/>
-              </a:spcBef>
-              <a:spcAft>
-                <a:spcPts val="0"/>
-              </a:spcAft>
-              <a:buNone/>
-            </a:pPr>
-            <a:r>
-              <a:rPr lang="en" sz="950">
-                <a:solidFill>
-                  <a:schemeClr val="lt2"/>
-                </a:solidFill>
-                <a:latin typeface="Inter SemiBold"/>
-                <a:ea typeface="Inter SemiBold"/>
-                <a:cs typeface="Inter SemiBold"/>
-                <a:sym typeface="Inter SemiBold"/>
-              </a:rPr>
-              <a:t>TEXT HERE</a:t>
-            </a:r>
-            <a:endParaRPr sz="950">
-              <a:solidFill>
-                <a:schemeClr val="lt2"/>
-              </a:solidFill>
-              <a:latin typeface="Inter SemiBold"/>
-              <a:ea typeface="Inter SemiBold"/>
-              <a:cs typeface="Inter SemiBold"/>
-              <a:sym typeface="Inter SemiBold"/>
-            </a:endParaRPr>
-          </a:p>
-        </p:txBody>
-      </p:sp>
-      <p:sp>
-        <p:nvSpPr>
-          <p:cNvPr id="358" name="Google Shape;358;p42"/>
-          <p:cNvSpPr txBox="1"/>
-          <p:nvPr/>
-        </p:nvSpPr>
-        <p:spPr>
-          <a:xfrm>
-            <a:off x="5084725" y="3262950"/>
-            <a:ext cx="1087200" cy="330900"/>
-          </a:xfrm>
-          <a:prstGeom prst="rect">
-            <a:avLst/>
-          </a:prstGeom>
-          <a:noFill/>
-          <a:ln>
-            <a:noFill/>
-          </a:ln>
-        </p:spPr>
-        <p:txBody>
-          <a:bodyPr anchorCtr="0" anchor="t" bIns="91425" lIns="91425" spcFirstLastPara="1" rIns="91425" wrap="square" tIns="91425">
-            <a:spAutoFit/>
-          </a:bodyPr>
-          <a:lstStyle/>
-          <a:p>
-            <a:pPr indent="0" lvl="0" marL="0" rtl="0" algn="ctr">
-              <a:lnSpc>
-                <a:spcPct val="115000"/>
-              </a:lnSpc>
-              <a:spcBef>
-                <a:spcPts val="0"/>
-              </a:spcBef>
-              <a:spcAft>
-                <a:spcPts val="0"/>
-              </a:spcAft>
-              <a:buNone/>
-            </a:pPr>
-            <a:r>
-              <a:rPr lang="en" sz="950">
-                <a:solidFill>
-                  <a:schemeClr val="lt2"/>
-                </a:solidFill>
-                <a:latin typeface="Inter SemiBold"/>
-                <a:ea typeface="Inter SemiBold"/>
-                <a:cs typeface="Inter SemiBold"/>
-                <a:sym typeface="Inter SemiBold"/>
-              </a:rPr>
-              <a:t>TEXT HERE</a:t>
-            </a:r>
-            <a:endParaRPr sz="950">
-              <a:solidFill>
-                <a:schemeClr val="lt2"/>
-              </a:solidFill>
-              <a:latin typeface="Inter SemiBold"/>
-              <a:ea typeface="Inter SemiBold"/>
-              <a:cs typeface="Inter SemiBold"/>
-              <a:sym typeface="Inter SemiBold"/>
-            </a:endParaRPr>
-          </a:p>
-        </p:txBody>
-      </p:sp>
-      <p:sp>
-        <p:nvSpPr>
-          <p:cNvPr id="359" name="Google Shape;359;p42"/>
           <p:cNvSpPr txBox="1"/>
           <p:nvPr>
             <p:ph idx="3" type="sldNum"/>

</xml_diff>